<commit_message>
added Corrections in "Konfigurationsmanagement" (HM)
</commit_message>
<xml_diff>
--- a/images/graphics.pptx
+++ b/images/graphics.pptx
@@ -5156,7 +5156,7 @@
           <a:p>
             <a:pPr algn="ctr"/>
             <a:r>
-              <a:rPr lang="en-US" sz="1600">
+              <a:rPr lang="en-US" sz="1600" dirty="0">
                 <a:latin typeface="Lato Light" panose="020F0502020204030203" pitchFamily="34" charset="0"/>
                 <a:ea typeface="Lato Light" panose="020F0502020204030203" pitchFamily="34" charset="0"/>
                 <a:cs typeface="Lato Light" panose="020F0502020204030203" pitchFamily="34" charset="0"/>
@@ -5171,16 +5171,16 @@
       </p:sp>
       <p:grpSp>
         <p:nvGrpSpPr>
-          <p:cNvPr id="76" name="Gruppieren 75"/>
+          <p:cNvPr id="55" name="Gruppieren 54"/>
           <p:cNvGrpSpPr/>
           <p:nvPr/>
         </p:nvGrpSpPr>
         <p:grpSpPr>
           <a:xfrm>
-            <a:off x="475616" y="883475"/>
-            <a:ext cx="11240768" cy="5091050"/>
-            <a:chOff x="229236" y="1168822"/>
-            <a:chExt cx="11240768" cy="5091050"/>
+            <a:off x="362016" y="390109"/>
+            <a:ext cx="11467969" cy="6077783"/>
+            <a:chOff x="316590" y="324675"/>
+            <a:chExt cx="11467969" cy="6077783"/>
           </a:xfrm>
         </p:grpSpPr>
         <p:sp>
@@ -5191,7 +5191,7 @@
           </p:nvSpPr>
           <p:spPr>
             <a:xfrm>
-              <a:off x="1483427" y="4994409"/>
+              <a:off x="1570781" y="3332981"/>
               <a:ext cx="1763486" cy="1265463"/>
             </a:xfrm>
             <a:prstGeom prst="flowChartDocument">
@@ -5269,7 +5269,7 @@
           </p:nvSpPr>
           <p:spPr>
             <a:xfrm>
-              <a:off x="1361744" y="1168822"/>
+              <a:off x="1449098" y="324675"/>
               <a:ext cx="2107900" cy="843160"/>
             </a:xfrm>
             <a:prstGeom prst="cube">
@@ -5335,7 +5335,7 @@
           </p:nvSpPr>
           <p:spPr>
             <a:xfrm>
-              <a:off x="7902674" y="1168822"/>
+              <a:off x="7773407" y="324675"/>
               <a:ext cx="2107900" cy="843160"/>
             </a:xfrm>
             <a:prstGeom prst="cube">
@@ -5401,7 +5401,7 @@
           </p:nvSpPr>
           <p:spPr>
             <a:xfrm>
-              <a:off x="4219167" y="1168822"/>
+              <a:off x="4216010" y="324675"/>
               <a:ext cx="2107900" cy="843160"/>
             </a:xfrm>
             <a:prstGeom prst="cube">
@@ -5470,8 +5470,8 @@
           </p:nvCxnSpPr>
           <p:spPr>
             <a:xfrm>
-              <a:off x="2358102" y="2011982"/>
-              <a:ext cx="7068" cy="2982427"/>
+              <a:off x="2445456" y="1167835"/>
+              <a:ext cx="7068" cy="2165146"/>
             </a:xfrm>
             <a:prstGeom prst="straightConnector1">
               <a:avLst/>
@@ -5506,7 +5506,7 @@
           </p:nvSpPr>
           <p:spPr>
             <a:xfrm>
-              <a:off x="2358103" y="3318529"/>
+              <a:off x="2445457" y="1942631"/>
               <a:ext cx="881742" cy="615553"/>
             </a:xfrm>
             <a:prstGeom prst="rect">
@@ -5557,7 +5557,7 @@
           </p:nvSpPr>
           <p:spPr>
             <a:xfrm>
-              <a:off x="229236" y="3763001"/>
+              <a:off x="316590" y="2101573"/>
               <a:ext cx="1792114" cy="679269"/>
             </a:xfrm>
             <a:prstGeom prst="borderCallout1">
@@ -5628,57 +5628,18 @@
             </a:p>
           </p:txBody>
         </p:sp>
-        <p:cxnSp>
-          <p:nvCxnSpPr>
-            <p:cNvPr id="25" name="Gerade Verbindung mit Pfeil 24"/>
-            <p:cNvCxnSpPr>
-              <a:endCxn id="30" idx="1"/>
-            </p:cNvCxnSpPr>
-            <p:nvPr/>
-          </p:nvCxnSpPr>
-          <p:spPr>
-            <a:xfrm>
-              <a:off x="5075493" y="5627141"/>
-              <a:ext cx="2931651" cy="0"/>
-            </a:xfrm>
-            <a:prstGeom prst="straightConnector1">
-              <a:avLst/>
-            </a:prstGeom>
-            <a:ln w="25400">
-              <a:solidFill>
-                <a:schemeClr val="tx1"/>
-              </a:solidFill>
-              <a:prstDash val="solid"/>
-              <a:tailEnd type="triangle" w="lg" len="lg"/>
-            </a:ln>
-          </p:spPr>
-          <p:style>
-            <a:lnRef idx="1">
-              <a:schemeClr val="accent1"/>
-            </a:lnRef>
-            <a:fillRef idx="0">
-              <a:schemeClr val="accent1"/>
-            </a:fillRef>
-            <a:effectRef idx="0">
-              <a:schemeClr val="accent1"/>
-            </a:effectRef>
-            <a:fontRef idx="minor">
-              <a:schemeClr val="tx1"/>
-            </a:fontRef>
-          </p:style>
-        </p:cxnSp>
         <p:sp>
           <p:nvSpPr>
-            <p:cNvPr id="29" name="Flussdiagramm: Mehrere Dokumente 28"/>
+            <p:cNvPr id="29" name="Flussdiagramm: Dokument 28"/>
             <p:cNvSpPr/>
             <p:nvPr/>
           </p:nvSpPr>
           <p:spPr>
             <a:xfrm>
-              <a:off x="9556437" y="2733321"/>
-              <a:ext cx="1913567" cy="1539749"/>
+              <a:off x="10233576" y="1667868"/>
+              <a:ext cx="1550983" cy="756000"/>
             </a:xfrm>
-            <a:prstGeom prst="flowChartMultidocument">
+            <a:prstGeom prst="flowChartDocument">
               <a:avLst/>
             </a:prstGeom>
             <a:solidFill>
@@ -5719,34 +5680,7 @@
                   </a:solidFill>
                   <a:latin typeface="CMU Serif" panose="02000603000000000000"/>
                 </a:rPr>
-                <a:t>Services, </a:t>
-              </a:r>
-              <a:r>
-                <a:rPr lang="en-US" sz="1400" dirty="0" err="1">
-                  <a:solidFill>
-                    <a:schemeClr val="tx1"/>
-                  </a:solidFill>
-                  <a:latin typeface="CMU Serif" panose="02000603000000000000"/>
-                </a:rPr>
-                <a:t>Webhooks</a:t>
-              </a:r>
-              <a:r>
-                <a:rPr lang="en-US" sz="1400" dirty="0">
-                  <a:solidFill>
-                    <a:schemeClr val="tx1"/>
-                  </a:solidFill>
-                  <a:latin typeface="CMU Serif" panose="02000603000000000000"/>
-                </a:rPr>
-                <a:t>, Deployment-</a:t>
-              </a:r>
-              <a:r>
-                <a:rPr lang="en-US" sz="1400" dirty="0" err="1">
-                  <a:solidFill>
-                    <a:schemeClr val="tx1"/>
-                  </a:solidFill>
-                  <a:latin typeface="CMU Serif" panose="02000603000000000000"/>
-                </a:rPr>
-                <a:t>Skripte</a:t>
+                <a:t>Services</a:t>
               </a:r>
               <a:endParaRPr lang="de-AT" sz="1400" dirty="0">
                 <a:solidFill>
@@ -5765,7 +5699,7 @@
           </p:nvSpPr>
           <p:spPr>
             <a:xfrm>
-              <a:off x="8007144" y="4994409"/>
+              <a:off x="4635425" y="5136995"/>
               <a:ext cx="1763486" cy="1265463"/>
             </a:xfrm>
             <a:prstGeom prst="flowChartDocument">
@@ -5845,8 +5779,8 @@
           </p:nvCxnSpPr>
           <p:spPr>
             <a:xfrm>
-              <a:off x="5215525" y="2011982"/>
-              <a:ext cx="0" cy="3615158"/>
+              <a:off x="5212368" y="1167835"/>
+              <a:ext cx="0" cy="3969160"/>
             </a:xfrm>
             <a:prstGeom prst="straightConnector1">
               <a:avLst/>
@@ -5855,7 +5789,7 @@
               <a:solidFill>
                 <a:schemeClr val="tx1"/>
               </a:solidFill>
-              <a:tailEnd type="none" w="lg" len="lg"/>
+              <a:tailEnd type="triangle" w="lg" len="lg"/>
             </a:ln>
           </p:spPr>
           <p:style>
@@ -5881,7 +5815,7 @@
           </p:nvSpPr>
           <p:spPr>
             <a:xfrm>
-              <a:off x="5248310" y="3318528"/>
+              <a:off x="5245153" y="2844638"/>
               <a:ext cx="892802" cy="615553"/>
             </a:xfrm>
             <a:prstGeom prst="rect">
@@ -5916,7 +5850,7 @@
                   <a:ea typeface="Lato Light" panose="020F0502020204030203" pitchFamily="34" charset="0"/>
                   <a:cs typeface="Lato Light" panose="020F0502020204030203" pitchFamily="34" charset="0"/>
                 </a:rPr>
-                <a:t>②</a:t>
+                <a:t>①</a:t>
               </a:r>
               <a:endParaRPr lang="de-AT" dirty="0">
                 <a:latin typeface="CMU Serif" panose="02000603000000000000"/>
@@ -5934,8 +5868,8 @@
           </p:nvCxnSpPr>
           <p:spPr>
             <a:xfrm>
-              <a:off x="3246913" y="5627141"/>
-              <a:ext cx="1968612" cy="0"/>
+              <a:off x="3334267" y="3965713"/>
+              <a:ext cx="1878101" cy="0"/>
             </a:xfrm>
             <a:prstGeom prst="straightConnector1">
               <a:avLst/>
@@ -5974,8 +5908,8 @@
           </p:nvCxnSpPr>
           <p:spPr>
             <a:xfrm>
-              <a:off x="6211883" y="1647994"/>
-              <a:ext cx="1690791" cy="0"/>
+              <a:off x="6208726" y="803847"/>
+              <a:ext cx="1564681" cy="0"/>
             </a:xfrm>
             <a:prstGeom prst="straightConnector1">
               <a:avLst/>
@@ -6010,7 +5944,7 @@
           </p:nvSpPr>
           <p:spPr>
             <a:xfrm>
-              <a:off x="6647258" y="1638252"/>
+              <a:off x="6644101" y="794105"/>
               <a:ext cx="809897" cy="615553"/>
             </a:xfrm>
             <a:prstGeom prst="rect">
@@ -6045,7 +5979,7 @@
                   <a:ea typeface="Lato Light" panose="020F0502020204030203" pitchFamily="34" charset="0"/>
                   <a:cs typeface="Lato Light" panose="020F0502020204030203" pitchFamily="34" charset="0"/>
                 </a:rPr>
-                <a:t>③</a:t>
+                <a:t>②</a:t>
               </a:r>
               <a:endParaRPr lang="de-AT" dirty="0">
                 <a:latin typeface="CMU Serif" panose="02000603000000000000"/>
@@ -6053,96 +5987,6 @@
             </a:p>
           </p:txBody>
         </p:sp>
-        <p:sp>
-          <p:nvSpPr>
-            <p:cNvPr id="58" name="Textfeld 57"/>
-            <p:cNvSpPr txBox="1"/>
-            <p:nvPr/>
-          </p:nvSpPr>
-          <p:spPr>
-            <a:xfrm>
-              <a:off x="3638990" y="5610328"/>
-              <a:ext cx="1192234" cy="615553"/>
-            </a:xfrm>
-            <a:prstGeom prst="rect">
-              <a:avLst/>
-            </a:prstGeom>
-            <a:noFill/>
-            <a:ln w="25400">
-              <a:noFill/>
-            </a:ln>
-          </p:spPr>
-          <p:txBody>
-            <a:bodyPr wrap="square" rtlCol="0" anchor="ctr">
-              <a:spAutoFit/>
-            </a:bodyPr>
-            <a:lstStyle/>
-            <a:p>
-              <a:pPr algn="ctr"/>
-              <a:r>
-                <a:rPr lang="en-US" dirty="0" err="1">
-                  <a:latin typeface="CMU Serif" panose="02000603000000000000"/>
-                </a:rPr>
-                <a:t>verwendet</a:t>
-              </a:r>
-              <a:br>
-                <a:rPr lang="en-US" dirty="0">
-                  <a:latin typeface="CMU Serif" panose="02000603000000000000"/>
-                </a:rPr>
-              </a:br>
-              <a:r>
-                <a:rPr lang="en-US" sz="1600" dirty="0">
-                  <a:latin typeface="Lato Light" panose="020F0502020204030203" pitchFamily="34" charset="0"/>
-                  <a:ea typeface="Lato Light" panose="020F0502020204030203" pitchFamily="34" charset="0"/>
-                  <a:cs typeface="Lato Light" panose="020F0502020204030203" pitchFamily="34" charset="0"/>
-                </a:rPr>
-                <a:t>①</a:t>
-              </a:r>
-              <a:endParaRPr lang="de-AT" dirty="0">
-                <a:latin typeface="CMU Serif" panose="02000603000000000000"/>
-              </a:endParaRPr>
-            </a:p>
-          </p:txBody>
-        </p:sp>
-        <p:cxnSp>
-          <p:nvCxnSpPr>
-            <p:cNvPr id="66" name="Gerade Verbindung mit Pfeil 65"/>
-            <p:cNvCxnSpPr>
-              <a:stCxn id="22" idx="3"/>
-              <a:endCxn id="30" idx="0"/>
-            </p:cNvCxnSpPr>
-            <p:nvPr/>
-          </p:nvCxnSpPr>
-          <p:spPr>
-            <a:xfrm flipH="1">
-              <a:off x="8888887" y="2011982"/>
-              <a:ext cx="10145" cy="2982427"/>
-            </a:xfrm>
-            <a:prstGeom prst="straightConnector1">
-              <a:avLst/>
-            </a:prstGeom>
-            <a:ln w="25400">
-              <a:solidFill>
-                <a:schemeClr val="tx1"/>
-              </a:solidFill>
-              <a:tailEnd type="triangle" w="lg" len="lg"/>
-            </a:ln>
-          </p:spPr>
-          <p:style>
-            <a:lnRef idx="1">
-              <a:schemeClr val="accent1"/>
-            </a:lnRef>
-            <a:fillRef idx="0">
-              <a:schemeClr val="accent1"/>
-            </a:fillRef>
-            <a:effectRef idx="0">
-              <a:schemeClr val="accent1"/>
-            </a:effectRef>
-            <a:fontRef idx="minor">
-              <a:schemeClr val="tx1"/>
-            </a:fontRef>
-          </p:style>
-        </p:cxnSp>
         <p:cxnSp>
           <p:nvCxnSpPr>
             <p:cNvPr id="71" name="Gerade Verbindung mit Pfeil 70"/>
@@ -6153,8 +5997,8 @@
           </p:nvCxnSpPr>
           <p:spPr>
             <a:xfrm>
-              <a:off x="8888887" y="3503196"/>
-              <a:ext cx="667550" cy="0"/>
+              <a:off x="8769766" y="2045868"/>
+              <a:ext cx="1463810" cy="0"/>
             </a:xfrm>
             <a:prstGeom prst="straightConnector1">
               <a:avLst/>
@@ -6164,6 +6008,7 @@
                 <a:schemeClr val="tx1"/>
               </a:solidFill>
               <a:prstDash val="dash"/>
+              <a:headEnd type="none" w="lg" len="lg"/>
               <a:tailEnd type="none" w="lg" len="lg"/>
             </a:ln>
           </p:spPr>
@@ -6190,7 +6035,7 @@
           </p:nvSpPr>
           <p:spPr>
             <a:xfrm>
-              <a:off x="7507662" y="3318528"/>
+              <a:off x="7378395" y="2844637"/>
               <a:ext cx="1381225" cy="615553"/>
             </a:xfrm>
             <a:prstGeom prst="rect">
@@ -6225,7 +6070,426 @@
                   <a:ea typeface="Lato Light" panose="020F0502020204030203" pitchFamily="34" charset="0"/>
                   <a:cs typeface="Lato Light" panose="020F0502020204030203" pitchFamily="34" charset="0"/>
                 </a:rPr>
-                <a:t>④</a:t>
+                <a:t>③</a:t>
+              </a:r>
+              <a:endParaRPr lang="de-AT" dirty="0">
+                <a:latin typeface="CMU Serif" panose="02000603000000000000"/>
+              </a:endParaRPr>
+            </a:p>
+          </p:txBody>
+        </p:sp>
+        <p:sp>
+          <p:nvSpPr>
+            <p:cNvPr id="32" name="Flussdiagramm: Dokument 31"/>
+            <p:cNvSpPr/>
+            <p:nvPr/>
+          </p:nvSpPr>
+          <p:spPr>
+            <a:xfrm>
+              <a:off x="10233576" y="2639699"/>
+              <a:ext cx="1550983" cy="756000"/>
+            </a:xfrm>
+            <a:prstGeom prst="flowChartDocument">
+              <a:avLst/>
+            </a:prstGeom>
+            <a:solidFill>
+              <a:schemeClr val="accent3">
+                <a:lumMod val="40000"/>
+                <a:lumOff val="60000"/>
+              </a:schemeClr>
+            </a:solidFill>
+            <a:ln>
+              <a:noFill/>
+            </a:ln>
+          </p:spPr>
+          <p:style>
+            <a:lnRef idx="2">
+              <a:schemeClr val="accent1">
+                <a:shade val="50000"/>
+              </a:schemeClr>
+            </a:lnRef>
+            <a:fillRef idx="1">
+              <a:schemeClr val="accent1"/>
+            </a:fillRef>
+            <a:effectRef idx="0">
+              <a:schemeClr val="accent1"/>
+            </a:effectRef>
+            <a:fontRef idx="minor">
+              <a:schemeClr val="lt1"/>
+            </a:fontRef>
+          </p:style>
+          <p:txBody>
+            <a:bodyPr rtlCol="0" anchor="ctr"/>
+            <a:lstStyle/>
+            <a:p>
+              <a:pPr algn="ctr"/>
+              <a:r>
+                <a:rPr lang="en-US" sz="1400" dirty="0" err="1">
+                  <a:solidFill>
+                    <a:schemeClr val="tx1"/>
+                  </a:solidFill>
+                  <a:latin typeface="CMU Serif" panose="02000603000000000000"/>
+                </a:rPr>
+                <a:t>Webhooks</a:t>
+              </a:r>
+              <a:endParaRPr lang="de-AT" sz="1400" dirty="0">
+                <a:solidFill>
+                  <a:schemeClr val="tx1"/>
+                </a:solidFill>
+                <a:latin typeface="CMU Serif" panose="02000603000000000000"/>
+              </a:endParaRPr>
+            </a:p>
+          </p:txBody>
+        </p:sp>
+        <p:sp>
+          <p:nvSpPr>
+            <p:cNvPr id="33" name="Flussdiagramm: Dokument 32"/>
+            <p:cNvSpPr/>
+            <p:nvPr/>
+          </p:nvSpPr>
+          <p:spPr>
+            <a:xfrm>
+              <a:off x="10233576" y="3611530"/>
+              <a:ext cx="1550983" cy="756000"/>
+            </a:xfrm>
+            <a:prstGeom prst="flowChartDocument">
+              <a:avLst/>
+            </a:prstGeom>
+            <a:solidFill>
+              <a:schemeClr val="accent3">
+                <a:lumMod val="40000"/>
+                <a:lumOff val="60000"/>
+              </a:schemeClr>
+            </a:solidFill>
+            <a:ln>
+              <a:noFill/>
+            </a:ln>
+          </p:spPr>
+          <p:style>
+            <a:lnRef idx="2">
+              <a:schemeClr val="accent1">
+                <a:shade val="50000"/>
+              </a:schemeClr>
+            </a:lnRef>
+            <a:fillRef idx="1">
+              <a:schemeClr val="accent1"/>
+            </a:fillRef>
+            <a:effectRef idx="0">
+              <a:schemeClr val="accent1"/>
+            </a:effectRef>
+            <a:fontRef idx="minor">
+              <a:schemeClr val="lt1"/>
+            </a:fontRef>
+          </p:style>
+          <p:txBody>
+            <a:bodyPr rtlCol="0" anchor="ctr"/>
+            <a:lstStyle/>
+            <a:p>
+              <a:pPr algn="ctr"/>
+              <a:r>
+                <a:rPr lang="en-US" sz="1400" dirty="0">
+                  <a:solidFill>
+                    <a:schemeClr val="tx1"/>
+                  </a:solidFill>
+                  <a:latin typeface="CMU Serif" panose="02000603000000000000"/>
+                </a:rPr>
+                <a:t>Deployment-</a:t>
+              </a:r>
+              <a:r>
+                <a:rPr lang="en-US" sz="1400" dirty="0" err="1">
+                  <a:solidFill>
+                    <a:schemeClr val="tx1"/>
+                  </a:solidFill>
+                  <a:latin typeface="CMU Serif" panose="02000603000000000000"/>
+                </a:rPr>
+                <a:t>Skripte</a:t>
+              </a:r>
+              <a:endParaRPr lang="de-AT" sz="1400" dirty="0">
+                <a:solidFill>
+                  <a:schemeClr val="tx1"/>
+                </a:solidFill>
+                <a:latin typeface="CMU Serif" panose="02000603000000000000"/>
+              </a:endParaRPr>
+            </a:p>
+          </p:txBody>
+        </p:sp>
+        <p:cxnSp>
+          <p:nvCxnSpPr>
+            <p:cNvPr id="12" name="Gewinkelter Verbinder 11"/>
+            <p:cNvCxnSpPr>
+              <a:stCxn id="22" idx="3"/>
+            </p:cNvCxnSpPr>
+            <p:nvPr/>
+          </p:nvCxnSpPr>
+          <p:spPr>
+            <a:xfrm rot="5400000">
+              <a:off x="5294959" y="1662189"/>
+              <a:ext cx="3969160" cy="2980453"/>
+            </a:xfrm>
+            <a:prstGeom prst="bentConnector3">
+              <a:avLst>
+                <a:gd name="adj1" fmla="val 90977"/>
+              </a:avLst>
+            </a:prstGeom>
+            <a:ln w="25400">
+              <a:solidFill>
+                <a:schemeClr val="tx1"/>
+              </a:solidFill>
+              <a:tailEnd type="triangle" w="lg" len="lg"/>
+            </a:ln>
+          </p:spPr>
+          <p:style>
+            <a:lnRef idx="1">
+              <a:schemeClr val="accent1"/>
+            </a:lnRef>
+            <a:fillRef idx="0">
+              <a:schemeClr val="accent1"/>
+            </a:fillRef>
+            <a:effectRef idx="0">
+              <a:schemeClr val="accent1"/>
+            </a:effectRef>
+            <a:fontRef idx="minor">
+              <a:schemeClr val="tx1"/>
+            </a:fontRef>
+          </p:style>
+        </p:cxnSp>
+        <p:cxnSp>
+          <p:nvCxnSpPr>
+            <p:cNvPr id="41" name="Gerade Verbindung mit Pfeil 40"/>
+            <p:cNvCxnSpPr>
+              <a:endCxn id="32" idx="1"/>
+            </p:cNvCxnSpPr>
+            <p:nvPr/>
+          </p:nvCxnSpPr>
+          <p:spPr>
+            <a:xfrm>
+              <a:off x="8769766" y="3011488"/>
+              <a:ext cx="1463810" cy="6211"/>
+            </a:xfrm>
+            <a:prstGeom prst="straightConnector1">
+              <a:avLst/>
+            </a:prstGeom>
+            <a:ln w="25400">
+              <a:solidFill>
+                <a:schemeClr val="tx1"/>
+              </a:solidFill>
+              <a:prstDash val="dash"/>
+              <a:headEnd type="none" w="lg" len="lg"/>
+              <a:tailEnd type="none" w="lg" len="lg"/>
+            </a:ln>
+          </p:spPr>
+          <p:style>
+            <a:lnRef idx="1">
+              <a:schemeClr val="accent1"/>
+            </a:lnRef>
+            <a:fillRef idx="0">
+              <a:schemeClr val="accent1"/>
+            </a:fillRef>
+            <a:effectRef idx="0">
+              <a:schemeClr val="accent1"/>
+            </a:effectRef>
+            <a:fontRef idx="minor">
+              <a:schemeClr val="tx1"/>
+            </a:fontRef>
+          </p:style>
+        </p:cxnSp>
+        <p:cxnSp>
+          <p:nvCxnSpPr>
+            <p:cNvPr id="42" name="Gerade Verbindung mit Pfeil 41"/>
+            <p:cNvCxnSpPr>
+              <a:endCxn id="33" idx="1"/>
+            </p:cNvCxnSpPr>
+            <p:nvPr/>
+          </p:nvCxnSpPr>
+          <p:spPr>
+            <a:xfrm>
+              <a:off x="8769766" y="3989530"/>
+              <a:ext cx="1463810" cy="0"/>
+            </a:xfrm>
+            <a:prstGeom prst="straightConnector1">
+              <a:avLst/>
+            </a:prstGeom>
+            <a:ln w="25400">
+              <a:solidFill>
+                <a:schemeClr val="tx1"/>
+              </a:solidFill>
+              <a:prstDash val="dash"/>
+              <a:headEnd type="none" w="lg" len="lg"/>
+              <a:tailEnd type="none" w="lg" len="lg"/>
+            </a:ln>
+          </p:spPr>
+          <p:style>
+            <a:lnRef idx="1">
+              <a:schemeClr val="accent1"/>
+            </a:lnRef>
+            <a:fillRef idx="0">
+              <a:schemeClr val="accent1"/>
+            </a:fillRef>
+            <a:effectRef idx="0">
+              <a:schemeClr val="accent1"/>
+            </a:effectRef>
+            <a:fontRef idx="minor">
+              <a:schemeClr val="tx1"/>
+            </a:fontRef>
+          </p:style>
+        </p:cxnSp>
+        <p:sp>
+          <p:nvSpPr>
+            <p:cNvPr id="62" name="Textfeld 61"/>
+            <p:cNvSpPr txBox="1"/>
+            <p:nvPr/>
+          </p:nvSpPr>
+          <p:spPr>
+            <a:xfrm>
+              <a:off x="3522268" y="3965712"/>
+              <a:ext cx="1495032" cy="369332"/>
+            </a:xfrm>
+            <a:prstGeom prst="rect">
+              <a:avLst/>
+            </a:prstGeom>
+            <a:noFill/>
+            <a:ln w="25400">
+              <a:noFill/>
+            </a:ln>
+          </p:spPr>
+          <p:txBody>
+            <a:bodyPr wrap="square" rtlCol="0" anchor="ctr">
+              <a:spAutoFit/>
+            </a:bodyPr>
+            <a:lstStyle/>
+            <a:p>
+              <a:pPr algn="ctr"/>
+              <a:r>
+                <a:rPr lang="en-US" dirty="0" err="1">
+                  <a:latin typeface="CMU Serif" panose="02000603000000000000"/>
+                </a:rPr>
+                <a:t>verwendet</a:t>
+              </a:r>
+              <a:endParaRPr lang="de-AT" dirty="0">
+                <a:latin typeface="CMU Serif" panose="02000603000000000000"/>
+              </a:endParaRPr>
+            </a:p>
+          </p:txBody>
+        </p:sp>
+        <p:sp>
+          <p:nvSpPr>
+            <p:cNvPr id="64" name="Textfeld 63"/>
+            <p:cNvSpPr txBox="1"/>
+            <p:nvPr/>
+          </p:nvSpPr>
+          <p:spPr>
+            <a:xfrm>
+              <a:off x="8815596" y="2039657"/>
+              <a:ext cx="1495032" cy="369332"/>
+            </a:xfrm>
+            <a:prstGeom prst="rect">
+              <a:avLst/>
+            </a:prstGeom>
+            <a:noFill/>
+            <a:ln w="25400">
+              <a:noFill/>
+            </a:ln>
+          </p:spPr>
+          <p:txBody>
+            <a:bodyPr wrap="square" rtlCol="0" anchor="ctr">
+              <a:spAutoFit/>
+            </a:bodyPr>
+            <a:lstStyle/>
+            <a:p>
+              <a:pPr algn="ctr"/>
+              <a:r>
+                <a:rPr lang="en-US" dirty="0" err="1">
+                  <a:latin typeface="CMU Serif" panose="02000603000000000000"/>
+                </a:rPr>
+                <a:t>startet</a:t>
+              </a:r>
+              <a:endParaRPr lang="de-AT" dirty="0">
+                <a:latin typeface="CMU Serif" panose="02000603000000000000"/>
+              </a:endParaRPr>
+            </a:p>
+          </p:txBody>
+        </p:sp>
+        <p:sp>
+          <p:nvSpPr>
+            <p:cNvPr id="67" name="Textfeld 66"/>
+            <p:cNvSpPr txBox="1"/>
+            <p:nvPr/>
+          </p:nvSpPr>
+          <p:spPr>
+            <a:xfrm>
+              <a:off x="8813869" y="3018185"/>
+              <a:ext cx="1495032" cy="369332"/>
+            </a:xfrm>
+            <a:prstGeom prst="rect">
+              <a:avLst/>
+            </a:prstGeom>
+            <a:noFill/>
+            <a:ln w="25400">
+              <a:noFill/>
+            </a:ln>
+          </p:spPr>
+          <p:txBody>
+            <a:bodyPr wrap="square" rtlCol="0" anchor="ctr">
+              <a:spAutoFit/>
+            </a:bodyPr>
+            <a:lstStyle/>
+            <a:p>
+              <a:pPr algn="ctr"/>
+              <a:r>
+                <a:rPr lang="en-US" dirty="0" err="1">
+                  <a:latin typeface="CMU Serif" panose="02000603000000000000"/>
+                </a:rPr>
+                <a:t>konfiguriert</a:t>
+              </a:r>
+              <a:endParaRPr lang="de-AT" dirty="0">
+                <a:latin typeface="CMU Serif" panose="02000603000000000000"/>
+              </a:endParaRPr>
+            </a:p>
+          </p:txBody>
+        </p:sp>
+        <p:sp>
+          <p:nvSpPr>
+            <p:cNvPr id="68" name="Textfeld 67"/>
+            <p:cNvSpPr txBox="1"/>
+            <p:nvPr/>
+          </p:nvSpPr>
+          <p:spPr>
+            <a:xfrm>
+              <a:off x="8749422" y="3998198"/>
+              <a:ext cx="1495032" cy="369332"/>
+            </a:xfrm>
+            <a:prstGeom prst="rect">
+              <a:avLst/>
+            </a:prstGeom>
+            <a:noFill/>
+            <a:ln w="25400">
+              <a:noFill/>
+            </a:ln>
+          </p:spPr>
+          <p:txBody>
+            <a:bodyPr wrap="square" rtlCol="0" anchor="ctr">
+              <a:spAutoFit/>
+            </a:bodyPr>
+            <a:lstStyle/>
+            <a:p>
+              <a:pPr algn="ctr"/>
+              <a:r>
+                <a:rPr lang="en-US" dirty="0" err="1">
+                  <a:latin typeface="CMU Serif" panose="02000603000000000000"/>
+                </a:rPr>
+                <a:t>führt</a:t>
+              </a:r>
+              <a:r>
+                <a:rPr lang="en-US" dirty="0">
+                  <a:latin typeface="CMU Serif" panose="02000603000000000000"/>
+                </a:rPr>
+                <a:t> </a:t>
+              </a:r>
+              <a:r>
+                <a:rPr lang="en-US" dirty="0" err="1">
+                  <a:latin typeface="CMU Serif" panose="02000603000000000000"/>
+                </a:rPr>
+                <a:t>aus</a:t>
               </a:r>
               <a:endParaRPr lang="de-AT" dirty="0">
                 <a:latin typeface="CMU Serif" panose="02000603000000000000"/>

</xml_diff>

<commit_message>
added fixes and new subsections
</commit_message>
<xml_diff>
--- a/images/graphics.pptx
+++ b/images/graphics.pptx
@@ -8533,34 +8533,34 @@
               <a:p>
                 <a:pPr algn="ctr"/>
                 <a:r>
-                  <a:rPr lang="en-US" sz="2400" dirty="0" err="1">
+                  <a:rPr lang="en-US" dirty="0" err="1">
                     <a:solidFill>
                       <a:schemeClr val="tx1"/>
                     </a:solidFill>
-                    <a:latin typeface="CMU Serif" panose="02000603000000000000" pitchFamily="2" charset="0"/>
-                    <a:ea typeface="CMU Serif" panose="02000603000000000000" pitchFamily="2" charset="0"/>
-                    <a:cs typeface="CMU Serif" panose="02000603000000000000" pitchFamily="2" charset="0"/>
+                    <a:latin typeface="Meslo LG M DZ for Powerline" panose="020B0609030804020204" pitchFamily="49" charset="0"/>
+                    <a:ea typeface="Meslo LG M DZ for Powerline" panose="020B0609030804020204" pitchFamily="49" charset="0"/>
+                    <a:cs typeface="Meslo LG M DZ for Powerline" panose="020B0609030804020204" pitchFamily="49" charset="0"/>
                   </a:rPr>
                   <a:t>docker</a:t>
                 </a:r>
                 <a:r>
-                  <a:rPr lang="en-US" sz="2400" dirty="0">
+                  <a:rPr lang="en-US" dirty="0">
                     <a:solidFill>
                       <a:schemeClr val="tx1"/>
                     </a:solidFill>
-                    <a:latin typeface="CMU Serif" panose="02000603000000000000" pitchFamily="2" charset="0"/>
-                    <a:ea typeface="CMU Serif" panose="02000603000000000000" pitchFamily="2" charset="0"/>
-                    <a:cs typeface="CMU Serif" panose="02000603000000000000" pitchFamily="2" charset="0"/>
+                    <a:latin typeface="Meslo LG M DZ for Powerline" panose="020B0609030804020204" pitchFamily="49" charset="0"/>
+                    <a:ea typeface="Meslo LG M DZ for Powerline" panose="020B0609030804020204" pitchFamily="49" charset="0"/>
+                    <a:cs typeface="Meslo LG M DZ for Powerline" panose="020B0609030804020204" pitchFamily="49" charset="0"/>
                   </a:rPr>
                   <a:t> run</a:t>
                 </a:r>
-                <a:endParaRPr lang="de-AT" sz="2400" dirty="0">
+                <a:endParaRPr lang="de-AT" dirty="0">
                   <a:solidFill>
                     <a:schemeClr val="tx1"/>
                   </a:solidFill>
-                  <a:latin typeface="CMU Serif" panose="02000603000000000000" pitchFamily="2" charset="0"/>
-                  <a:ea typeface="CMU Serif" panose="02000603000000000000" pitchFamily="2" charset="0"/>
-                  <a:cs typeface="CMU Serif" panose="02000603000000000000" pitchFamily="2" charset="0"/>
+                  <a:latin typeface="Meslo LG M DZ for Powerline" panose="020B0609030804020204" pitchFamily="49" charset="0"/>
+                  <a:ea typeface="Meslo LG M DZ for Powerline" panose="020B0609030804020204" pitchFamily="49" charset="0"/>
+                  <a:cs typeface="Meslo LG M DZ for Powerline" panose="020B0609030804020204" pitchFamily="49" charset="0"/>
                 </a:endParaRPr>
               </a:p>
             </p:txBody>

</xml_diff>